<commit_message>
fix typo in softmax pres
</commit_message>
<xml_diff>
--- a/Presentations/Stats - Softmax.pptx
+++ b/Presentations/Stats - Softmax.pptx
@@ -3439,11 +3439,7 @@
             </a:r>
             <a:r>
               <a:rPr lang="en-US" dirty="0" smtClean="0"/>
-              <a:t> </a:t>
-            </a:r>
-            <a:r>
-              <a:rPr lang="en-US" dirty="0" smtClean="0"/>
-              <a:t>Equation</a:t>
+              <a:t> Equation</a:t>
             </a:r>
             <a:br>
               <a:rPr lang="en-US" dirty="0" smtClean="0"/>
@@ -4077,17 +4073,7 @@
                   </a:schemeClr>
                 </a:solidFill>
               </a:rPr>
-              <a:t> </a:t>
-            </a:r>
-            <a:r>
-              <a:rPr lang="en-US" sz="2400" b="1" dirty="0" smtClean="0">
-                <a:solidFill>
-                  <a:schemeClr val="accent5">
-                    <a:lumMod val="75000"/>
-                  </a:schemeClr>
-                </a:solidFill>
-              </a:rPr>
-              <a:t>is the maximum in x ∈ S, when:</a:t>
+              <a:t> is the maximum in x ∈ S, when:</a:t>
             </a:r>
           </a:p>
           <a:p>
@@ -4494,17 +4480,7 @@
                   </a:schemeClr>
                 </a:solidFill>
               </a:rPr>
-              <a:t> </a:t>
-            </a:r>
-            <a:r>
-              <a:rPr lang="en-US" dirty="0" smtClean="0">
-                <a:solidFill>
-                  <a:schemeClr val="accent1">
-                    <a:lumMod val="75000"/>
-                  </a:schemeClr>
-                </a:solidFill>
-              </a:rPr>
-              <a:t>Equation</a:t>
+              <a:t> Equation</a:t>
             </a:r>
             <a:endParaRPr lang="en-US" dirty="0">
               <a:solidFill>
@@ -4594,7 +4570,7 @@
               <a:t>softmax</a:t>
             </a:r>
             <a:r>
-              <a:rPr lang="en-US" sz="2400" b="1" dirty="0" smtClean="0">
+              <a:rPr lang="en-US" sz="2400" b="1" smtClean="0">
                 <a:solidFill>
                   <a:schemeClr val="accent5">
                     <a:lumMod val="75000"/>
@@ -4604,14 +4580,14 @@
               <a:t>() </a:t>
             </a:r>
             <a:r>
-              <a:rPr lang="en-US" sz="2400" b="1" dirty="0" err="1" smtClean="0">
+              <a:rPr lang="en-US" sz="2400" b="1" smtClean="0">
                 <a:solidFill>
                   <a:schemeClr val="accent5">
                     <a:lumMod val="75000"/>
                   </a:schemeClr>
                 </a:solidFill>
               </a:rPr>
-              <a:t>eqVCauation</a:t>
+              <a:t>equation </a:t>
             </a:r>
             <a:r>
               <a:rPr lang="en-US" sz="2400" b="1" dirty="0" smtClean="0">
@@ -4621,7 +4597,7 @@
                   </a:schemeClr>
                 </a:solidFill>
               </a:rPr>
-              <a:t> takes as input a set of real values,</a:t>
+              <a:t>takes as input a set of real values,</a:t>
             </a:r>
           </a:p>
           <a:p>
@@ -6255,17 +6231,7 @@
                   </a:schemeClr>
                 </a:solidFill>
               </a:rPr>
-              <a:t> </a:t>
-            </a:r>
-            <a:r>
-              <a:rPr lang="en-US" dirty="0" smtClean="0">
-                <a:solidFill>
-                  <a:schemeClr val="accent1">
-                    <a:lumMod val="75000"/>
-                  </a:schemeClr>
-                </a:solidFill>
-              </a:rPr>
-              <a:t>Equation</a:t>
+              <a:t> Equation</a:t>
             </a:r>
             <a:endParaRPr lang="en-US" dirty="0">
               <a:solidFill>
@@ -6308,8 +6274,8 @@
           </a:fontRef>
         </p:style>
       </p:cxnSp>
-      <mc:AlternateContent xmlns:mc="http://schemas.openxmlformats.org/markup-compatibility/2006">
-        <mc:Choice xmlns:a14="http://schemas.microsoft.com/office/drawing/2010/main" Requires="a14">
+      <mc:AlternateContent xmlns:mc="http://schemas.openxmlformats.org/markup-compatibility/2006" xmlns:a14="http://schemas.microsoft.com/office/drawing/2010/main">
+        <mc:Choice Requires="a14">
           <p:sp>
             <p:nvSpPr>
               <p:cNvPr id="36" name="TextBox 35"/>
@@ -6573,11 +6539,7 @@
                 </a:r>
                 <a:r>
                   <a:rPr lang="en-US" sz="2000" b="1" dirty="0" smtClean="0"/>
-                  <a:t>f</a:t>
-                </a:r>
-                <a:r>
-                  <a:rPr lang="en-US" sz="2000" b="1" dirty="0" smtClean="0"/>
-                  <a:t>(</a:t>
+                  <a:t>f(</a:t>
                 </a:r>
                 <a:r>
                   <a:rPr lang="en-US" sz="2000" b="1" dirty="0" err="1" smtClean="0"/>
@@ -6772,7 +6734,6 @@
                 </a:r>
               </a:p>
               <a:p>
-                <a:pPr/>
                 <a:r>
                   <a:rPr lang="en-US" b="1" dirty="0">
                     <a:solidFill>
@@ -6868,7 +6829,6 @@
                 </a:r>
               </a:p>
               <a:p>
-                <a:pPr/>
                 <a:r>
                   <a:rPr lang="en-US" b="1" dirty="0">
                     <a:solidFill>
@@ -6893,7 +6853,6 @@
                 </a:r>
               </a:p>
               <a:p>
-                <a:pPr/>
                 <a:r>
                   <a:rPr lang="en-US" b="1" dirty="0">
                     <a:solidFill>
@@ -6918,7 +6877,6 @@
                 </a:r>
               </a:p>
               <a:p>
-                <a:pPr/>
                 <a:r>
                   <a:rPr lang="en-US" b="1" dirty="0">
                     <a:solidFill>
@@ -6949,7 +6907,7 @@
             </p:txBody>
           </p:sp>
         </mc:Choice>
-        <mc:Fallback>
+        <mc:Fallback xmlns="">
           <p:sp>
             <p:nvSpPr>
               <p:cNvPr id="36" name="TextBox 35"/>

</xml_diff>

<commit_message>
update to softmax pres
</commit_message>
<xml_diff>
--- a/Presentations/Stats - Softmax.pptx
+++ b/Presentations/Stats - Softmax.pptx
@@ -5,7 +5,7 @@
     <p:sldMasterId id="2147483648" r:id="rId1"/>
   </p:sldMasterIdLst>
   <p:notesMasterIdLst>
-    <p:notesMasterId r:id="rId7"/>
+    <p:notesMasterId r:id="rId8"/>
   </p:notesMasterIdLst>
   <p:sldIdLst>
     <p:sldId id="256" r:id="rId2"/>
@@ -13,6 +13,7 @@
     <p:sldId id="282" r:id="rId4"/>
     <p:sldId id="283" r:id="rId5"/>
     <p:sldId id="284" r:id="rId6"/>
+    <p:sldId id="285" r:id="rId7"/>
   </p:sldIdLst>
   <p:sldSz cx="9144000" cy="6858000" type="screen4x3"/>
   <p:notesSz cx="6858000" cy="9144000"/>
@@ -196,7 +197,7 @@
           <a:p>
             <a:fld id="{FAF957FC-5175-49AC-8D2B-2F056FFFC1DD}" type="datetimeFigureOut">
               <a:rPr lang="en-US" smtClean="0"/>
-              <a:t>7/31/2017</a:t>
+              <a:t>9/7/2017</a:t>
             </a:fld>
             <a:endParaRPr lang="en-US"/>
           </a:p>
@@ -646,7 +647,7 @@
             <a:fld id="{1D8BD707-D9CF-40AE-B4C6-C98DA3205C09}" type="datetimeFigureOut">
               <a:rPr lang="en-US" smtClean="0"/>
               <a:pPr/>
-              <a:t>7/31/2017</a:t>
+              <a:t>9/7/2017</a:t>
             </a:fld>
             <a:endParaRPr lang="en-US"/>
           </a:p>
@@ -813,7 +814,7 @@
             <a:fld id="{1D8BD707-D9CF-40AE-B4C6-C98DA3205C09}" type="datetimeFigureOut">
               <a:rPr lang="en-US" smtClean="0"/>
               <a:pPr/>
-              <a:t>7/31/2017</a:t>
+              <a:t>9/7/2017</a:t>
             </a:fld>
             <a:endParaRPr lang="en-US"/>
           </a:p>
@@ -990,7 +991,7 @@
             <a:fld id="{1D8BD707-D9CF-40AE-B4C6-C98DA3205C09}" type="datetimeFigureOut">
               <a:rPr lang="en-US" smtClean="0"/>
               <a:pPr/>
-              <a:t>7/31/2017</a:t>
+              <a:t>9/7/2017</a:t>
             </a:fld>
             <a:endParaRPr lang="en-US"/>
           </a:p>
@@ -1157,7 +1158,7 @@
             <a:fld id="{1D8BD707-D9CF-40AE-B4C6-C98DA3205C09}" type="datetimeFigureOut">
               <a:rPr lang="en-US" smtClean="0"/>
               <a:pPr/>
-              <a:t>7/31/2017</a:t>
+              <a:t>9/7/2017</a:t>
             </a:fld>
             <a:endParaRPr lang="en-US"/>
           </a:p>
@@ -1400,7 +1401,7 @@
             <a:fld id="{1D8BD707-D9CF-40AE-B4C6-C98DA3205C09}" type="datetimeFigureOut">
               <a:rPr lang="en-US" smtClean="0"/>
               <a:pPr/>
-              <a:t>7/31/2017</a:t>
+              <a:t>9/7/2017</a:t>
             </a:fld>
             <a:endParaRPr lang="en-US"/>
           </a:p>
@@ -1685,7 +1686,7 @@
             <a:fld id="{1D8BD707-D9CF-40AE-B4C6-C98DA3205C09}" type="datetimeFigureOut">
               <a:rPr lang="en-US" smtClean="0"/>
               <a:pPr/>
-              <a:t>7/31/2017</a:t>
+              <a:t>9/7/2017</a:t>
             </a:fld>
             <a:endParaRPr lang="en-US"/>
           </a:p>
@@ -2104,7 +2105,7 @@
             <a:fld id="{1D8BD707-D9CF-40AE-B4C6-C98DA3205C09}" type="datetimeFigureOut">
               <a:rPr lang="en-US" smtClean="0"/>
               <a:pPr/>
-              <a:t>7/31/2017</a:t>
+              <a:t>9/7/2017</a:t>
             </a:fld>
             <a:endParaRPr lang="en-US"/>
           </a:p>
@@ -2219,7 +2220,7 @@
             <a:fld id="{1D8BD707-D9CF-40AE-B4C6-C98DA3205C09}" type="datetimeFigureOut">
               <a:rPr lang="en-US" smtClean="0"/>
               <a:pPr/>
-              <a:t>7/31/2017</a:t>
+              <a:t>9/7/2017</a:t>
             </a:fld>
             <a:endParaRPr lang="en-US"/>
           </a:p>
@@ -2311,7 +2312,7 @@
             <a:fld id="{1D8BD707-D9CF-40AE-B4C6-C98DA3205C09}" type="datetimeFigureOut">
               <a:rPr lang="en-US" smtClean="0"/>
               <a:pPr/>
-              <a:t>7/31/2017</a:t>
+              <a:t>9/7/2017</a:t>
             </a:fld>
             <a:endParaRPr lang="en-US"/>
           </a:p>
@@ -2585,7 +2586,7 @@
             <a:fld id="{1D8BD707-D9CF-40AE-B4C6-C98DA3205C09}" type="datetimeFigureOut">
               <a:rPr lang="en-US" smtClean="0"/>
               <a:pPr/>
-              <a:t>7/31/2017</a:t>
+              <a:t>9/7/2017</a:t>
             </a:fld>
             <a:endParaRPr lang="en-US"/>
           </a:p>
@@ -2835,7 +2836,7 @@
             <a:fld id="{1D8BD707-D9CF-40AE-B4C6-C98DA3205C09}" type="datetimeFigureOut">
               <a:rPr lang="en-US" smtClean="0"/>
               <a:pPr/>
-              <a:t>7/31/2017</a:t>
+              <a:t>9/7/2017</a:t>
             </a:fld>
             <a:endParaRPr lang="en-US"/>
           </a:p>
@@ -3045,7 +3046,7 @@
             <a:fld id="{1D8BD707-D9CF-40AE-B4C6-C98DA3205C09}" type="datetimeFigureOut">
               <a:rPr lang="en-US" smtClean="0"/>
               <a:pPr/>
-              <a:t>7/31/2017</a:t>
+              <a:t>9/7/2017</a:t>
             </a:fld>
             <a:endParaRPr lang="en-US"/>
           </a:p>
@@ -10452,6 +10453,576 @@
 </p:sld>
 </file>
 
+<file path=ppt/slides/slide6.xml><?xml version="1.0" encoding="utf-8"?>
+<p:sld xmlns:a="http://schemas.openxmlformats.org/drawingml/2006/main" xmlns:r="http://schemas.openxmlformats.org/officeDocument/2006/relationships" xmlns:p="http://schemas.openxmlformats.org/presentationml/2006/main">
+  <p:cSld>
+    <p:spTree>
+      <p:nvGrpSpPr>
+        <p:cNvPr id="1" name=""/>
+        <p:cNvGrpSpPr/>
+        <p:nvPr/>
+      </p:nvGrpSpPr>
+      <p:grpSpPr>
+        <a:xfrm>
+          <a:off x="0" y="0"/>
+          <a:ext cx="0" cy="0"/>
+          <a:chOff x="0" y="0"/>
+          <a:chExt cx="0" cy="0"/>
+        </a:xfrm>
+      </p:grpSpPr>
+      <p:sp>
+        <p:nvSpPr>
+          <p:cNvPr id="2" name="Title 1"/>
+          <p:cNvSpPr>
+            <a:spLocks noGrp="1"/>
+          </p:cNvSpPr>
+          <p:nvPr>
+            <p:ph type="title"/>
+          </p:nvPr>
+        </p:nvSpPr>
+        <p:spPr>
+          <a:xfrm>
+            <a:off x="457200" y="274638"/>
+            <a:ext cx="8305800" cy="792162"/>
+          </a:xfrm>
+        </p:spPr>
+        <p:txBody>
+          <a:bodyPr>
+            <a:normAutofit/>
+          </a:bodyPr>
+          <a:lstStyle/>
+          <a:p>
+            <a:pPr algn="l"/>
+            <a:r>
+              <a:rPr lang="en-US" dirty="0" smtClean="0">
+                <a:solidFill>
+                  <a:schemeClr val="accent1">
+                    <a:lumMod val="75000"/>
+                  </a:schemeClr>
+                </a:solidFill>
+              </a:rPr>
+              <a:t>Torch Library</a:t>
+            </a:r>
+            <a:endParaRPr lang="en-US" dirty="0">
+              <a:solidFill>
+                <a:schemeClr val="accent1">
+                  <a:lumMod val="75000"/>
+                </a:schemeClr>
+              </a:solidFill>
+            </a:endParaRPr>
+          </a:p>
+        </p:txBody>
+      </p:sp>
+      <p:cxnSp>
+        <p:nvCxnSpPr>
+          <p:cNvPr id="5" name="Straight Connector 4"/>
+          <p:cNvCxnSpPr/>
+          <p:nvPr/>
+        </p:nvCxnSpPr>
+        <p:spPr>
+          <a:xfrm>
+            <a:off x="0" y="990600"/>
+            <a:ext cx="9144000" cy="0"/>
+          </a:xfrm>
+          <a:prstGeom prst="line">
+            <a:avLst/>
+          </a:prstGeom>
+          <a:ln w="19050"/>
+        </p:spPr>
+        <p:style>
+          <a:lnRef idx="1">
+            <a:schemeClr val="accent1"/>
+          </a:lnRef>
+          <a:fillRef idx="0">
+            <a:schemeClr val="accent1"/>
+          </a:fillRef>
+          <a:effectRef idx="0">
+            <a:schemeClr val="accent1"/>
+          </a:effectRef>
+          <a:fontRef idx="minor">
+            <a:schemeClr val="tx1"/>
+          </a:fontRef>
+        </p:style>
+      </p:cxnSp>
+      <p:sp>
+        <p:nvSpPr>
+          <p:cNvPr id="36" name="TextBox 35"/>
+          <p:cNvSpPr txBox="1"/>
+          <p:nvPr/>
+        </p:nvSpPr>
+        <p:spPr>
+          <a:xfrm>
+            <a:off x="152400" y="1164134"/>
+            <a:ext cx="7774885" cy="4647426"/>
+          </a:xfrm>
+          <a:prstGeom prst="rect">
+            <a:avLst/>
+          </a:prstGeom>
+          <a:noFill/>
+        </p:spPr>
+        <p:txBody>
+          <a:bodyPr wrap="none" rtlCol="0">
+            <a:spAutoFit/>
+          </a:bodyPr>
+          <a:lstStyle/>
+          <a:p>
+            <a:r>
+              <a:rPr lang="en-US" sz="2400" b="1" dirty="0">
+                <a:solidFill>
+                  <a:schemeClr val="accent5">
+                    <a:lumMod val="75000"/>
+                  </a:schemeClr>
+                </a:solidFill>
+              </a:rPr>
+              <a:t>	</a:t>
+            </a:r>
+            <a:r>
+              <a:rPr lang="en-US" sz="2400" b="1" dirty="0" smtClean="0">
+                <a:solidFill>
+                  <a:schemeClr val="accent5">
+                    <a:lumMod val="75000"/>
+                  </a:schemeClr>
+                </a:solidFill>
+              </a:rPr>
+              <a:t>	</a:t>
+            </a:r>
+            <a:r>
+              <a:rPr lang="en-US" sz="2400" b="1" dirty="0" smtClean="0">
+                <a:solidFill>
+                  <a:srgbClr val="00B0F0"/>
+                </a:solidFill>
+              </a:rPr>
+              <a:t>torch is a python library for machine learning</a:t>
+            </a:r>
+          </a:p>
+          <a:p>
+            <a:r>
+              <a:rPr lang="en-US" sz="2400" b="1" dirty="0">
+                <a:solidFill>
+                  <a:schemeClr val="accent5">
+                    <a:lumMod val="75000"/>
+                  </a:schemeClr>
+                </a:solidFill>
+              </a:rPr>
+              <a:t>	</a:t>
+            </a:r>
+            <a:endParaRPr lang="en-US" sz="2400" b="1" dirty="0" smtClean="0">
+              <a:solidFill>
+                <a:schemeClr val="accent5">
+                  <a:lumMod val="75000"/>
+                </a:schemeClr>
+              </a:solidFill>
+            </a:endParaRPr>
+          </a:p>
+          <a:p>
+            <a:r>
+              <a:rPr lang="en-US" sz="1400" b="1" dirty="0" smtClean="0">
+                <a:solidFill>
+                  <a:srgbClr val="00B050"/>
+                </a:solidFill>
+              </a:rPr>
+              <a:t>		Neural Networks		Support Functions	Name Alias</a:t>
+            </a:r>
+            <a:endParaRPr lang="en-US" sz="1400" b="1" dirty="0">
+              <a:solidFill>
+                <a:srgbClr val="00B050"/>
+              </a:solidFill>
+            </a:endParaRPr>
+          </a:p>
+          <a:p>
+            <a:r>
+              <a:rPr lang="en-US" sz="2400" b="1" dirty="0" smtClean="0">
+                <a:solidFill>
+                  <a:schemeClr val="accent5">
+                    <a:lumMod val="75000"/>
+                  </a:schemeClr>
+                </a:solidFill>
+              </a:rPr>
+              <a:t>	</a:t>
+            </a:r>
+          </a:p>
+          <a:p>
+            <a:r>
+              <a:rPr lang="en-US" sz="2400" b="1" dirty="0">
+                <a:solidFill>
+                  <a:schemeClr val="accent5">
+                    <a:lumMod val="75000"/>
+                  </a:schemeClr>
+                </a:solidFill>
+              </a:rPr>
+              <a:t>	</a:t>
+            </a:r>
+            <a:r>
+              <a:rPr lang="en-US" sz="2400" b="1" dirty="0" smtClean="0">
+                <a:solidFill>
+                  <a:schemeClr val="accent5">
+                    <a:lumMod val="75000"/>
+                  </a:schemeClr>
+                </a:solidFill>
+              </a:rPr>
+              <a:t>	im</a:t>
+            </a:r>
+            <a:r>
+              <a:rPr lang="en-US" sz="2400" b="1" dirty="0" smtClean="0">
+                <a:solidFill>
+                  <a:schemeClr val="accent5">
+                    <a:lumMod val="75000"/>
+                  </a:schemeClr>
+                </a:solidFill>
+              </a:rPr>
+              <a:t>port </a:t>
+            </a:r>
+            <a:r>
+              <a:rPr lang="en-US" sz="2400" b="1" dirty="0" err="1" smtClean="0"/>
+              <a:t>torch.nn.functional</a:t>
+            </a:r>
+            <a:r>
+              <a:rPr lang="en-US" sz="2400" b="1" dirty="0" smtClean="0">
+                <a:solidFill>
+                  <a:schemeClr val="accent5">
+                    <a:lumMod val="75000"/>
+                  </a:schemeClr>
+                </a:solidFill>
+              </a:rPr>
+              <a:t> as </a:t>
+            </a:r>
+            <a:r>
+              <a:rPr lang="en-US" sz="2400" b="1" dirty="0" smtClean="0"/>
+              <a:t>F</a:t>
+            </a:r>
+          </a:p>
+          <a:p>
+            <a:r>
+              <a:rPr lang="en-US" sz="2400" b="1" dirty="0">
+                <a:solidFill>
+                  <a:schemeClr val="accent5">
+                    <a:lumMod val="75000"/>
+                  </a:schemeClr>
+                </a:solidFill>
+              </a:rPr>
+              <a:t>	</a:t>
+            </a:r>
+            <a:r>
+              <a:rPr lang="en-US" sz="2400" b="1" dirty="0" smtClean="0">
+                <a:solidFill>
+                  <a:schemeClr val="accent5">
+                    <a:lumMod val="75000"/>
+                  </a:schemeClr>
+                </a:solidFill>
+              </a:rPr>
+              <a:t>	</a:t>
+            </a:r>
+            <a:r>
+              <a:rPr lang="en-US" sz="2400" b="1" dirty="0" smtClean="0"/>
+              <a:t>probabilities = </a:t>
+            </a:r>
+            <a:r>
+              <a:rPr lang="en-US" sz="2400" b="1" dirty="0" err="1" smtClean="0"/>
+              <a:t>F.softmax</a:t>
+            </a:r>
+            <a:r>
+              <a:rPr lang="en-US" sz="2400" b="1" dirty="0" smtClean="0"/>
+              <a:t>( list )</a:t>
+            </a:r>
+            <a:r>
+              <a:rPr lang="en-US" sz="2400" b="1" dirty="0" smtClean="0">
+                <a:solidFill>
+                  <a:schemeClr val="accent5">
+                    <a:lumMod val="75000"/>
+                  </a:schemeClr>
+                </a:solidFill>
+              </a:rPr>
+              <a:t>		</a:t>
+            </a:r>
+            <a:endParaRPr lang="en-US" sz="2000" b="1" dirty="0" smtClean="0"/>
+          </a:p>
+          <a:p>
+            <a:r>
+              <a:rPr lang="en-US" b="1" dirty="0" smtClean="0"/>
+              <a:t>		</a:t>
+            </a:r>
+            <a:endParaRPr lang="en-US" b="1" dirty="0" smtClean="0"/>
+          </a:p>
+          <a:p>
+            <a:endParaRPr lang="en-US" b="1" dirty="0" smtClean="0"/>
+          </a:p>
+          <a:p>
+            <a:r>
+              <a:rPr lang="en-US" sz="1400" b="1" dirty="0" smtClean="0">
+                <a:solidFill>
+                  <a:srgbClr val="00B050"/>
+                </a:solidFill>
+              </a:rPr>
+              <a:t>Results returned as a list					list of values outputted</a:t>
+            </a:r>
+          </a:p>
+          <a:p>
+            <a:r>
+              <a:rPr lang="en-US" sz="1400" b="1" dirty="0" smtClean="0">
+                <a:solidFill>
+                  <a:srgbClr val="00B050"/>
+                </a:solidFill>
+              </a:rPr>
+              <a:t>probabilities adding up to 1				by neural network</a:t>
+            </a:r>
+          </a:p>
+          <a:p>
+            <a:endParaRPr lang="en-US" sz="1400" b="1" dirty="0">
+              <a:solidFill>
+                <a:srgbClr val="00B050"/>
+              </a:solidFill>
+            </a:endParaRPr>
+          </a:p>
+          <a:p>
+            <a:endParaRPr lang="en-US" sz="1400" b="1" dirty="0" smtClean="0">
+              <a:solidFill>
+                <a:srgbClr val="00B050"/>
+              </a:solidFill>
+            </a:endParaRPr>
+          </a:p>
+          <a:p>
+            <a:r>
+              <a:rPr lang="en-US" sz="1400" b="1" dirty="0" smtClean="0"/>
+              <a:t>Example:</a:t>
+            </a:r>
+          </a:p>
+          <a:p>
+            <a:r>
+              <a:rPr lang="en-US" sz="1400" b="1" dirty="0"/>
+              <a:t>	</a:t>
+            </a:r>
+            <a:r>
+              <a:rPr lang="en-US" sz="1400" b="1" dirty="0" smtClean="0"/>
+              <a:t>0.98, 0.012, 0.002 = </a:t>
+            </a:r>
+            <a:r>
+              <a:rPr lang="en-US" sz="1400" b="1" dirty="0" err="1" smtClean="0"/>
+              <a:t>F.softmax</a:t>
+            </a:r>
+            <a:r>
+              <a:rPr lang="en-US" sz="1400" b="1" dirty="0" smtClean="0"/>
+              <a:t>( [ 8, 4, 2 ] )</a:t>
+            </a:r>
+          </a:p>
+          <a:p>
+            <a:endParaRPr lang="en-US" sz="1400" b="1" dirty="0">
+              <a:solidFill>
+                <a:srgbClr val="00B050"/>
+              </a:solidFill>
+            </a:endParaRPr>
+          </a:p>
+          <a:p>
+            <a:endParaRPr lang="en-US" sz="1400" b="1" dirty="0" smtClean="0">
+              <a:solidFill>
+                <a:srgbClr val="00B050"/>
+              </a:solidFill>
+            </a:endParaRPr>
+          </a:p>
+          <a:p>
+            <a:endParaRPr lang="en-US" sz="1400" b="1" dirty="0"/>
+          </a:p>
+        </p:txBody>
+      </p:sp>
+      <p:cxnSp>
+        <p:nvCxnSpPr>
+          <p:cNvPr id="6" name="Straight Arrow Connector 5"/>
+          <p:cNvCxnSpPr/>
+          <p:nvPr/>
+        </p:nvCxnSpPr>
+        <p:spPr>
+          <a:xfrm>
+            <a:off x="3048000" y="2133600"/>
+            <a:ext cx="685800" cy="457200"/>
+          </a:xfrm>
+          <a:prstGeom prst="straightConnector1">
+            <a:avLst/>
+          </a:prstGeom>
+          <a:ln w="12700">
+            <a:solidFill>
+              <a:srgbClr val="00B050"/>
+            </a:solidFill>
+            <a:tailEnd type="arrow"/>
+          </a:ln>
+        </p:spPr>
+        <p:style>
+          <a:lnRef idx="1">
+            <a:schemeClr val="accent1"/>
+          </a:lnRef>
+          <a:fillRef idx="0">
+            <a:schemeClr val="accent1"/>
+          </a:fillRef>
+          <a:effectRef idx="0">
+            <a:schemeClr val="accent1"/>
+          </a:effectRef>
+          <a:fontRef idx="minor">
+            <a:schemeClr val="tx1"/>
+          </a:fontRef>
+        </p:style>
+      </p:cxnSp>
+      <p:cxnSp>
+        <p:nvCxnSpPr>
+          <p:cNvPr id="9" name="Straight Arrow Connector 8"/>
+          <p:cNvCxnSpPr/>
+          <p:nvPr/>
+        </p:nvCxnSpPr>
+        <p:spPr>
+          <a:xfrm flipH="1">
+            <a:off x="4591050" y="2133600"/>
+            <a:ext cx="762000" cy="457200"/>
+          </a:xfrm>
+          <a:prstGeom prst="straightConnector1">
+            <a:avLst/>
+          </a:prstGeom>
+          <a:ln w="12700">
+            <a:solidFill>
+              <a:srgbClr val="00B050"/>
+            </a:solidFill>
+            <a:tailEnd type="arrow"/>
+          </a:ln>
+        </p:spPr>
+        <p:style>
+          <a:lnRef idx="1">
+            <a:schemeClr val="accent1"/>
+          </a:lnRef>
+          <a:fillRef idx="0">
+            <a:schemeClr val="accent1"/>
+          </a:fillRef>
+          <a:effectRef idx="0">
+            <a:schemeClr val="accent1"/>
+          </a:effectRef>
+          <a:fontRef idx="minor">
+            <a:schemeClr val="tx1"/>
+          </a:fontRef>
+        </p:style>
+      </p:cxnSp>
+      <p:cxnSp>
+        <p:nvCxnSpPr>
+          <p:cNvPr id="11" name="Straight Arrow Connector 10"/>
+          <p:cNvCxnSpPr/>
+          <p:nvPr/>
+        </p:nvCxnSpPr>
+        <p:spPr>
+          <a:xfrm flipH="1">
+            <a:off x="6096000" y="2171700"/>
+            <a:ext cx="762000" cy="457200"/>
+          </a:xfrm>
+          <a:prstGeom prst="straightConnector1">
+            <a:avLst/>
+          </a:prstGeom>
+          <a:ln w="12700">
+            <a:solidFill>
+              <a:srgbClr val="00B050"/>
+            </a:solidFill>
+            <a:tailEnd type="arrow"/>
+          </a:ln>
+        </p:spPr>
+        <p:style>
+          <a:lnRef idx="1">
+            <a:schemeClr val="accent1"/>
+          </a:lnRef>
+          <a:fillRef idx="0">
+            <a:schemeClr val="accent1"/>
+          </a:fillRef>
+          <a:effectRef idx="0">
+            <a:schemeClr val="accent1"/>
+          </a:effectRef>
+          <a:fontRef idx="minor">
+            <a:schemeClr val="tx1"/>
+          </a:fontRef>
+        </p:style>
+      </p:cxnSp>
+      <p:cxnSp>
+        <p:nvCxnSpPr>
+          <p:cNvPr id="12" name="Straight Arrow Connector 11"/>
+          <p:cNvCxnSpPr/>
+          <p:nvPr/>
+        </p:nvCxnSpPr>
+        <p:spPr>
+          <a:xfrm flipV="1">
+            <a:off x="2362200" y="3276600"/>
+            <a:ext cx="533400" cy="381000"/>
+          </a:xfrm>
+          <a:prstGeom prst="straightConnector1">
+            <a:avLst/>
+          </a:prstGeom>
+          <a:ln w="12700">
+            <a:solidFill>
+              <a:srgbClr val="00B050"/>
+            </a:solidFill>
+            <a:tailEnd type="arrow"/>
+          </a:ln>
+        </p:spPr>
+        <p:style>
+          <a:lnRef idx="1">
+            <a:schemeClr val="accent1"/>
+          </a:lnRef>
+          <a:fillRef idx="0">
+            <a:schemeClr val="accent1"/>
+          </a:fillRef>
+          <a:effectRef idx="0">
+            <a:schemeClr val="accent1"/>
+          </a:effectRef>
+          <a:fontRef idx="minor">
+            <a:schemeClr val="tx1"/>
+          </a:fontRef>
+        </p:style>
+      </p:cxnSp>
+      <p:cxnSp>
+        <p:nvCxnSpPr>
+          <p:cNvPr id="14" name="Straight Arrow Connector 13"/>
+          <p:cNvCxnSpPr/>
+          <p:nvPr/>
+        </p:nvCxnSpPr>
+        <p:spPr>
+          <a:xfrm flipH="1" flipV="1">
+            <a:off x="5562600" y="3276600"/>
+            <a:ext cx="457200" cy="485775"/>
+          </a:xfrm>
+          <a:prstGeom prst="straightConnector1">
+            <a:avLst/>
+          </a:prstGeom>
+          <a:ln w="12700">
+            <a:solidFill>
+              <a:srgbClr val="00B050"/>
+            </a:solidFill>
+            <a:tailEnd type="arrow"/>
+          </a:ln>
+        </p:spPr>
+        <p:style>
+          <a:lnRef idx="1">
+            <a:schemeClr val="accent1"/>
+          </a:lnRef>
+          <a:fillRef idx="0">
+            <a:schemeClr val="accent1"/>
+          </a:fillRef>
+          <a:effectRef idx="0">
+            <a:schemeClr val="accent1"/>
+          </a:effectRef>
+          <a:fontRef idx="minor">
+            <a:schemeClr val="tx1"/>
+          </a:fontRef>
+        </p:style>
+      </p:cxnSp>
+    </p:spTree>
+    <p:extLst>
+      <p:ext uri="{BB962C8B-B14F-4D97-AF65-F5344CB8AC3E}">
+        <p14:creationId xmlns:p14="http://schemas.microsoft.com/office/powerpoint/2010/main" val="1504700356"/>
+      </p:ext>
+    </p:extLst>
+  </p:cSld>
+  <p:clrMapOvr>
+    <a:masterClrMapping/>
+  </p:clrMapOvr>
+  <p:timing>
+    <p:tnLst>
+      <p:par>
+        <p:cTn id="1" dur="indefinite" restart="never" nodeType="tmRoot"/>
+      </p:par>
+    </p:tnLst>
+  </p:timing>
+</p:sld>
+</file>
+
 <file path=ppt/theme/theme1.xml><?xml version="1.0" encoding="utf-8"?>
 <a:theme xmlns:a="http://schemas.openxmlformats.org/drawingml/2006/main" name="Office Theme">
   <a:themeElements>

</xml_diff>